<commit_message>
Powerpoint with Ricky's changes
</commit_message>
<xml_diff>
--- a/it115grp2Presentation .pptx
+++ b/it115grp2Presentation .pptx
@@ -13,7 +13,7 @@
     <p:sldId id="364" r:id="rId8"/>
     <p:sldId id="371" r:id="rId9"/>
     <p:sldId id="365" r:id="rId10"/>
-    <p:sldId id="369" r:id="rId11"/>
+    <p:sldId id="389" r:id="rId11"/>
     <p:sldId id="383" r:id="rId12"/>
     <p:sldId id="366" r:id="rId13"/>
     <p:sldId id="370" r:id="rId14"/>
@@ -14483,8 +14483,7 @@
           <a:p>
             <a:pPr algn="ctr"/>
             <a:r>
-              <a:rPr lang="" altLang="en-US" sz="3200" b="1">
-                <a:ln/>
+              <a:rPr lang="en-US" altLang="en-US" sz="3200" b="1">
                 <a:solidFill>
                   <a:schemeClr val="tx1"/>
                 </a:solidFill>
@@ -14498,8 +14497,7 @@
               </a:rPr>
               <a:t>Super-Linter Workflow</a:t>
             </a:r>
-            <a:endParaRPr lang="" altLang="en-US" sz="3200" b="1">
-              <a:ln/>
+            <a:endParaRPr lang="en-US" altLang="en-US" sz="3200" b="1">
               <a:solidFill>
                 <a:schemeClr val="tx1"/>
               </a:solidFill>
@@ -15795,41 +15793,27 @@
             <p:ph type="title"/>
           </p:nvPr>
         </p:nvSpPr>
-        <p:spPr/>
+        <p:spPr>
+          <a:xfrm>
+            <a:off x="1155065" y="789940"/>
+            <a:ext cx="3185795" cy="774065"/>
+          </a:xfrm>
+        </p:spPr>
         <p:txBody>
           <a:bodyPr/>
           <a:lstStyle/>
           <a:p>
             <a:r>
-              <a:rPr lang="en-US" dirty="0"/>
-              <a:t>RICKY – Web Server Hosting, Process for Configuring Web Server</a:t>
+              <a:rPr lang="" altLang="en-US" dirty="0"/>
+              <a:t>Web Server Hosting</a:t>
             </a:r>
-            <a:endParaRPr lang="en-US" dirty="0"/>
+            <a:endParaRPr lang="" altLang="en-US" dirty="0"/>
           </a:p>
         </p:txBody>
       </p:sp>
       <p:sp>
         <p:nvSpPr>
-          <p:cNvPr id="3" name="Text Placeholder 2"/>
-          <p:cNvSpPr>
-            <a:spLocks noGrp="1"/>
-          </p:cNvSpPr>
-          <p:nvPr>
-            <p:ph type="body" sz="half" idx="13"/>
-          </p:nvPr>
-        </p:nvSpPr>
-        <p:spPr/>
-        <p:txBody>
-          <a:bodyPr/>
-          <a:lstStyle/>
-          <a:p>
-            <a:endParaRPr lang="en-US" dirty="0"/>
-          </a:p>
-        </p:txBody>
-      </p:sp>
-      <p:sp>
-        <p:nvSpPr>
-          <p:cNvPr id="4" name="Text Placeholder 3"/>
+          <p:cNvPr id="16" name="Text Placeholder 15"/>
           <p:cNvSpPr>
             <a:spLocks noGrp="1"/>
           </p:cNvSpPr>
@@ -15837,15 +15821,279 @@
             <p:ph type="body" sz="half" idx="2"/>
           </p:nvPr>
         </p:nvSpPr>
-        <p:spPr/>
+        <p:spPr>
+          <a:xfrm>
+            <a:off x="753110" y="1739265"/>
+            <a:ext cx="3587750" cy="4285615"/>
+          </a:xfrm>
+        </p:spPr>
         <p:txBody>
           <a:bodyPr/>
-          <a:lstStyle/>
-          <a:p>
-            <a:endParaRPr lang="en-US" dirty="0"/>
+          <a:p>
+            <a:pPr marL="285750" indent="-285750">
+              <a:buFont typeface="Arial" panose="020B0604020202020204" pitchFamily="34" charset="0"/>
+              <a:buChar char="•"/>
+            </a:pPr>
+            <a:r>
+              <a:rPr lang="en-US" altLang="en-US">
+                <a:solidFill>
+                  <a:schemeClr val="bg1"/>
+                </a:solidFill>
+                <a:sym typeface="+mn-ea"/>
+              </a:rPr>
+              <a:t>We chose to use two separate AWS EC2 instances to host </a:t>
+            </a:r>
+            <a:r>
+              <a:rPr lang="" altLang="en-US">
+                <a:solidFill>
+                  <a:schemeClr val="bg1"/>
+                </a:solidFill>
+                <a:sym typeface="+mn-ea"/>
+              </a:rPr>
+              <a:t>the </a:t>
+            </a:r>
+            <a:r>
+              <a:rPr lang="en-US" altLang="en-US">
+                <a:solidFill>
+                  <a:schemeClr val="bg1"/>
+                </a:solidFill>
+                <a:sym typeface="+mn-ea"/>
+              </a:rPr>
+              <a:t>web content for </a:t>
+            </a:r>
+            <a:r>
+              <a:rPr lang="" altLang="en-US">
+                <a:solidFill>
+                  <a:schemeClr val="bg1"/>
+                </a:solidFill>
+                <a:sym typeface="+mn-ea"/>
+              </a:rPr>
+              <a:t>both</a:t>
+            </a:r>
+            <a:r>
+              <a:rPr lang="en-US" altLang="en-US">
+                <a:solidFill>
+                  <a:schemeClr val="bg1"/>
+                </a:solidFill>
+                <a:sym typeface="+mn-ea"/>
+              </a:rPr>
+              <a:t> our general project page and our Survey application. </a:t>
+            </a:r>
+            <a:endParaRPr lang="en-US" altLang="en-US">
+              <a:solidFill>
+                <a:schemeClr val="bg1"/>
+              </a:solidFill>
+              <a:sym typeface="+mn-ea"/>
+            </a:endParaRPr>
+          </a:p>
+          <a:p>
+            <a:pPr marL="285750" indent="-285750">
+              <a:buFont typeface="Arial" panose="020B0604020202020204" pitchFamily="34" charset="0"/>
+              <a:buChar char="•"/>
+            </a:pPr>
+            <a:r>
+              <a:rPr lang="" altLang="en-US">
+                <a:solidFill>
+                  <a:schemeClr val="bg1"/>
+                </a:solidFill>
+                <a:sym typeface="+mn-ea"/>
+              </a:rPr>
+              <a:t>T</a:t>
+            </a:r>
+            <a:r>
+              <a:rPr lang="en-US" altLang="en-US">
+                <a:solidFill>
+                  <a:schemeClr val="bg1"/>
+                </a:solidFill>
+                <a:sym typeface="+mn-ea"/>
+              </a:rPr>
+              <a:t>he servers </a:t>
+            </a:r>
+            <a:r>
+              <a:rPr lang="" altLang="en-US">
+                <a:solidFill>
+                  <a:schemeClr val="bg1"/>
+                </a:solidFill>
+                <a:sym typeface="+mn-ea"/>
+              </a:rPr>
+              <a:t>were configured </a:t>
+            </a:r>
+            <a:r>
+              <a:rPr lang="en-US" altLang="en-US">
+                <a:solidFill>
+                  <a:schemeClr val="bg1"/>
+                </a:solidFill>
+                <a:sym typeface="+mn-ea"/>
+              </a:rPr>
+              <a:t>using the free Ubuntu 20.04 version, and connected via SSH using a new key pair created with the included tool. </a:t>
+            </a:r>
+            <a:endParaRPr lang="en-US" altLang="en-US">
+              <a:solidFill>
+                <a:schemeClr val="bg1"/>
+              </a:solidFill>
+            </a:endParaRPr>
+          </a:p>
+          <a:p>
+            <a:pPr marL="285750" indent="-285750">
+              <a:buFont typeface="Arial" panose="020B0604020202020204" pitchFamily="34" charset="0"/>
+              <a:buChar char="•"/>
+            </a:pPr>
+            <a:r>
+              <a:rPr lang="" altLang="en-US">
+                <a:solidFill>
+                  <a:schemeClr val="bg1"/>
+                </a:solidFill>
+                <a:sym typeface="+mn-ea"/>
+              </a:rPr>
+              <a:t>In Network Settings, we enabled traffic from SSH in order to connect remotely to the server using PuTTY, and HTTP for use as a public server </a:t>
+            </a:r>
+            <a:endParaRPr lang="en-US" altLang="en-US">
+              <a:solidFill>
+                <a:schemeClr val="bg1"/>
+              </a:solidFill>
+            </a:endParaRPr>
+          </a:p>
+          <a:p>
+            <a:pPr marL="285750" indent="-285750">
+              <a:buFont typeface="Arial" panose="020B0604020202020204" pitchFamily="34" charset="0"/>
+              <a:buChar char="•"/>
+            </a:pPr>
+            <a:r>
+              <a:rPr lang="" altLang="en-US">
+                <a:solidFill>
+                  <a:schemeClr val="bg1"/>
+                </a:solidFill>
+              </a:rPr>
+              <a:t>Finally, we can see our two instances running without issue.</a:t>
+            </a:r>
+            <a:endParaRPr lang="" altLang="en-US">
+              <a:solidFill>
+                <a:schemeClr val="bg1"/>
+              </a:solidFill>
+            </a:endParaRPr>
           </a:p>
         </p:txBody>
       </p:sp>
+      <p:pic>
+        <p:nvPicPr>
+          <p:cNvPr id="15" name="Picture 14" descr="Screenshot from 2022-05-30 12-32-09"/>
+          <p:cNvPicPr>
+            <a:picLocks noChangeAspect="1"/>
+          </p:cNvPicPr>
+          <p:nvPr/>
+        </p:nvPicPr>
+        <p:blipFill>
+          <a:blip r:embed="rId1"/>
+          <a:stretch>
+            <a:fillRect/>
+          </a:stretch>
+        </p:blipFill>
+        <p:spPr>
+          <a:xfrm>
+            <a:off x="5112385" y="5485765"/>
+            <a:ext cx="6899275" cy="752475"/>
+          </a:xfrm>
+          <a:prstGeom prst="rect">
+            <a:avLst/>
+          </a:prstGeom>
+        </p:spPr>
+      </p:pic>
+      <p:pic>
+        <p:nvPicPr>
+          <p:cNvPr id="18" name="Picture 17" descr="Screenshot from 2022-05-30 12-37-32"/>
+          <p:cNvPicPr>
+            <a:picLocks noChangeAspect="1"/>
+          </p:cNvPicPr>
+          <p:nvPr/>
+        </p:nvPicPr>
+        <p:blipFill>
+          <a:blip r:embed="rId2"/>
+          <a:stretch>
+            <a:fillRect/>
+          </a:stretch>
+        </p:blipFill>
+        <p:spPr>
+          <a:xfrm>
+            <a:off x="5624195" y="287655"/>
+            <a:ext cx="942975" cy="1276350"/>
+          </a:xfrm>
+          <a:prstGeom prst="rect">
+            <a:avLst/>
+          </a:prstGeom>
+        </p:spPr>
+      </p:pic>
+      <p:pic>
+        <p:nvPicPr>
+          <p:cNvPr id="19" name="Picture 18" descr="Screenshot from 2022-05-30 12-37-55"/>
+          <p:cNvPicPr>
+            <a:picLocks noChangeAspect="1"/>
+          </p:cNvPicPr>
+          <p:nvPr/>
+        </p:nvPicPr>
+        <p:blipFill>
+          <a:blip r:embed="rId3"/>
+          <a:stretch>
+            <a:fillRect/>
+          </a:stretch>
+        </p:blipFill>
+        <p:spPr>
+          <a:xfrm>
+            <a:off x="5257165" y="1564005"/>
+            <a:ext cx="6609715" cy="590550"/>
+          </a:xfrm>
+          <a:prstGeom prst="rect">
+            <a:avLst/>
+          </a:prstGeom>
+        </p:spPr>
+      </p:pic>
+      <p:pic>
+        <p:nvPicPr>
+          <p:cNvPr id="21" name="Picture 20" descr="Screenshot from 2022-05-30 12-38-43"/>
+          <p:cNvPicPr>
+            <a:picLocks noChangeAspect="1"/>
+          </p:cNvPicPr>
+          <p:nvPr/>
+        </p:nvPicPr>
+        <p:blipFill>
+          <a:blip r:embed="rId4"/>
+          <a:stretch>
+            <a:fillRect/>
+          </a:stretch>
+        </p:blipFill>
+        <p:spPr>
+          <a:xfrm>
+            <a:off x="7377430" y="3742690"/>
+            <a:ext cx="4283075" cy="1428115"/>
+          </a:xfrm>
+          <a:prstGeom prst="rect">
+            <a:avLst/>
+          </a:prstGeom>
+        </p:spPr>
+      </p:pic>
+      <p:pic>
+        <p:nvPicPr>
+          <p:cNvPr id="22" name="Picture 21" descr="Screenshot from 2022-05-30 12-42-11"/>
+          <p:cNvPicPr>
+            <a:picLocks noChangeAspect="1"/>
+          </p:cNvPicPr>
+          <p:nvPr/>
+        </p:nvPicPr>
+        <p:blipFill>
+          <a:blip r:embed="rId5"/>
+          <a:stretch>
+            <a:fillRect/>
+          </a:stretch>
+        </p:blipFill>
+        <p:spPr>
+          <a:xfrm>
+            <a:off x="5257165" y="2379345"/>
+            <a:ext cx="5410835" cy="1139190"/>
+          </a:xfrm>
+          <a:prstGeom prst="rect">
+            <a:avLst/>
+          </a:prstGeom>
+        </p:spPr>
+      </p:pic>
     </p:spTree>
   </p:cSld>
   <p:clrMapOvr>
@@ -15863,14 +16111,7 @@
         <p:cNvGrpSpPr/>
         <p:nvPr/>
       </p:nvGrpSpPr>
-      <p:grpSpPr>
-        <a:xfrm>
-          <a:off x="0" y="0"/>
-          <a:ext cx="0" cy="0"/>
-          <a:chOff x="0" y="0"/>
-          <a:chExt cx="0" cy="0"/>
-        </a:xfrm>
-      </p:grpSpPr>
+      <p:grpSpPr/>
       <p:sp>
         <p:nvSpPr>
           <p:cNvPr id="2" name="Title 1"/>
@@ -15881,35 +16122,20 @@
             <p:ph type="title"/>
           </p:nvPr>
         </p:nvSpPr>
-        <p:spPr/>
+        <p:spPr>
+          <a:xfrm>
+            <a:off x="732155" y="561975"/>
+            <a:ext cx="3794125" cy="981075"/>
+          </a:xfrm>
+        </p:spPr>
         <p:txBody>
           <a:bodyPr/>
-          <a:lstStyle/>
           <a:p>
             <a:r>
-              <a:rPr lang="en-US" dirty="0"/>
-              <a:t>RICKY – Super-linter workflow</a:t>
+              <a:rPr lang="" altLang="en-US"/>
+              <a:t>Web Server Configuration</a:t>
             </a:r>
-            <a:endParaRPr lang="en-US" dirty="0"/>
-          </a:p>
-        </p:txBody>
-      </p:sp>
-      <p:sp>
-        <p:nvSpPr>
-          <p:cNvPr id="3" name="Text Placeholder 2"/>
-          <p:cNvSpPr>
-            <a:spLocks noGrp="1"/>
-          </p:cNvSpPr>
-          <p:nvPr>
-            <p:ph type="body" sz="half" idx="13"/>
-          </p:nvPr>
-        </p:nvSpPr>
-        <p:spPr/>
-        <p:txBody>
-          <a:bodyPr/>
-          <a:lstStyle/>
-          <a:p>
-            <a:endParaRPr lang="en-US" dirty="0"/>
+            <a:endParaRPr lang="" altLang="en-US"/>
           </a:p>
         </p:txBody>
       </p:sp>
@@ -15923,15 +16149,238 @@
             <p:ph type="body" sz="half" idx="2"/>
           </p:nvPr>
         </p:nvSpPr>
-        <p:spPr/>
+        <p:spPr>
+          <a:xfrm>
+            <a:off x="732155" y="1911985"/>
+            <a:ext cx="3576955" cy="4123690"/>
+          </a:xfrm>
+        </p:spPr>
         <p:txBody>
-          <a:bodyPr/>
-          <a:lstStyle/>
-          <a:p>
-            <a:endParaRPr lang="en-US" dirty="0"/>
+          <a:bodyPr>
+            <a:normAutofit lnSpcReduction="10000"/>
+          </a:bodyPr>
+          <a:p>
+            <a:pPr marL="285750" indent="-285750">
+              <a:buFont typeface="Arial" panose="020B0604020202020204" pitchFamily="34" charset="0"/>
+              <a:buChar char="•"/>
+            </a:pPr>
+            <a:r>
+              <a:rPr lang="" altLang="en-US">
+                <a:solidFill>
+                  <a:schemeClr val="bg1"/>
+                </a:solidFill>
+              </a:rPr>
+              <a:t>To connect to our newly configured instances, we connected via PuTTY using our newly created SSH key pair.</a:t>
+            </a:r>
+            <a:endParaRPr lang="" altLang="en-US">
+              <a:solidFill>
+                <a:schemeClr val="bg1"/>
+              </a:solidFill>
+            </a:endParaRPr>
+          </a:p>
+          <a:p>
+            <a:pPr marL="285750" indent="-285750">
+              <a:buFont typeface="Arial" panose="020B0604020202020204" pitchFamily="34" charset="0"/>
+              <a:buChar char="•"/>
+            </a:pPr>
+            <a:r>
+              <a:rPr lang="" altLang="en-US">
+                <a:solidFill>
+                  <a:schemeClr val="bg1"/>
+                </a:solidFill>
+              </a:rPr>
+              <a:t>Once in, we ran an update and installed Apache2 as our web server. Now our instances' Public IPv4 addresses were the host addresses for our servers.</a:t>
+            </a:r>
+            <a:endParaRPr lang="" altLang="en-US">
+              <a:solidFill>
+                <a:schemeClr val="bg1"/>
+              </a:solidFill>
+            </a:endParaRPr>
+          </a:p>
+          <a:p>
+            <a:pPr marL="285750" indent="-285750">
+              <a:buFont typeface="Arial" panose="020B0604020202020204" pitchFamily="34" charset="0"/>
+              <a:buChar char="•"/>
+            </a:pPr>
+            <a:r>
+              <a:rPr lang="" altLang="en-US">
+                <a:solidFill>
+                  <a:schemeClr val="bg1"/>
+                </a:solidFill>
+              </a:rPr>
+              <a:t>In order to get our webpage and application files onto the servers, we used FileZilla. </a:t>
+            </a:r>
+            <a:endParaRPr lang="" altLang="en-US">
+              <a:solidFill>
+                <a:schemeClr val="bg1"/>
+              </a:solidFill>
+            </a:endParaRPr>
+          </a:p>
+          <a:p>
+            <a:pPr marL="285750" indent="-285750">
+              <a:buFont typeface="Arial" panose="020B0604020202020204" pitchFamily="34" charset="0"/>
+              <a:buChar char="•"/>
+            </a:pPr>
+            <a:r>
+              <a:rPr lang="" altLang="en-US">
+                <a:solidFill>
+                  <a:schemeClr val="bg1"/>
+                </a:solidFill>
+              </a:rPr>
+              <a:t>Once our required files had been moved into the /var/www/html directory in the instance, our webpage and application content was up and running!</a:t>
+            </a:r>
+            <a:endParaRPr lang="" altLang="en-US">
+              <a:solidFill>
+                <a:schemeClr val="bg1"/>
+              </a:solidFill>
+            </a:endParaRPr>
           </a:p>
         </p:txBody>
       </p:sp>
+      <p:pic>
+        <p:nvPicPr>
+          <p:cNvPr id="6" name="Picture 5" descr="Screenshot from 2022-05-30 12-50-59"/>
+          <p:cNvPicPr>
+            <a:picLocks noChangeAspect="1"/>
+          </p:cNvPicPr>
+          <p:nvPr/>
+        </p:nvPicPr>
+        <p:blipFill>
+          <a:blip r:embed="rId1"/>
+          <a:stretch>
+            <a:fillRect/>
+          </a:stretch>
+        </p:blipFill>
+        <p:spPr>
+          <a:xfrm>
+            <a:off x="4955540" y="484505"/>
+            <a:ext cx="4773930" cy="1221740"/>
+          </a:xfrm>
+          <a:prstGeom prst="rect">
+            <a:avLst/>
+          </a:prstGeom>
+        </p:spPr>
+      </p:pic>
+      <p:pic>
+        <p:nvPicPr>
+          <p:cNvPr id="9" name="Picture 8" descr="Screenshot from 2022-05-30 12-57-50"/>
+          <p:cNvPicPr>
+            <a:picLocks noChangeAspect="1"/>
+          </p:cNvPicPr>
+          <p:nvPr/>
+        </p:nvPicPr>
+        <p:blipFill>
+          <a:blip r:embed="rId2"/>
+          <a:stretch>
+            <a:fillRect/>
+          </a:stretch>
+        </p:blipFill>
+        <p:spPr>
+          <a:xfrm>
+            <a:off x="4955540" y="2022475"/>
+            <a:ext cx="3310255" cy="553720"/>
+          </a:xfrm>
+          <a:prstGeom prst="rect">
+            <a:avLst/>
+          </a:prstGeom>
+        </p:spPr>
+      </p:pic>
+      <p:pic>
+        <p:nvPicPr>
+          <p:cNvPr id="10" name="Picture 9" descr="Screenshot from 2022-05-30 13-02-17"/>
+          <p:cNvPicPr>
+            <a:picLocks noChangeAspect="1"/>
+          </p:cNvPicPr>
+          <p:nvPr/>
+        </p:nvPicPr>
+        <p:blipFill>
+          <a:blip r:embed="rId3"/>
+          <a:stretch>
+            <a:fillRect/>
+          </a:stretch>
+        </p:blipFill>
+        <p:spPr>
+          <a:xfrm>
+            <a:off x="8265795" y="3797935"/>
+            <a:ext cx="2915285" cy="2677160"/>
+          </a:xfrm>
+          <a:prstGeom prst="rect">
+            <a:avLst/>
+          </a:prstGeom>
+        </p:spPr>
+      </p:pic>
+      <p:pic>
+        <p:nvPicPr>
+          <p:cNvPr id="11" name="Picture 10" descr="Screenshot from 2022-05-30 13-17-50"/>
+          <p:cNvPicPr>
+            <a:picLocks noChangeAspect="1"/>
+          </p:cNvPicPr>
+          <p:nvPr/>
+        </p:nvPicPr>
+        <p:blipFill>
+          <a:blip r:embed="rId4"/>
+          <a:stretch>
+            <a:fillRect/>
+          </a:stretch>
+        </p:blipFill>
+        <p:spPr>
+          <a:xfrm>
+            <a:off x="4955540" y="3144520"/>
+            <a:ext cx="3409315" cy="123825"/>
+          </a:xfrm>
+          <a:prstGeom prst="rect">
+            <a:avLst/>
+          </a:prstGeom>
+        </p:spPr>
+      </p:pic>
+      <p:pic>
+        <p:nvPicPr>
+          <p:cNvPr id="12" name="Picture 11" descr="Screenshot from 2022-05-30 13-18-32"/>
+          <p:cNvPicPr>
+            <a:picLocks noChangeAspect="1"/>
+          </p:cNvPicPr>
+          <p:nvPr/>
+        </p:nvPicPr>
+        <p:blipFill>
+          <a:blip r:embed="rId5"/>
+          <a:stretch>
+            <a:fillRect/>
+          </a:stretch>
+        </p:blipFill>
+        <p:spPr>
+          <a:xfrm>
+            <a:off x="4955540" y="3268345"/>
+            <a:ext cx="4095115" cy="152400"/>
+          </a:xfrm>
+          <a:prstGeom prst="rect">
+            <a:avLst/>
+          </a:prstGeom>
+        </p:spPr>
+      </p:pic>
+      <p:pic>
+        <p:nvPicPr>
+          <p:cNvPr id="13" name="Picture 12" descr="Screenshot from 2022-05-30 13-19-08"/>
+          <p:cNvPicPr>
+            <a:picLocks noChangeAspect="1"/>
+          </p:cNvPicPr>
+          <p:nvPr/>
+        </p:nvPicPr>
+        <p:blipFill>
+          <a:blip r:embed="rId6"/>
+          <a:stretch>
+            <a:fillRect/>
+          </a:stretch>
+        </p:blipFill>
+        <p:spPr>
+          <a:xfrm>
+            <a:off x="4955540" y="3420745"/>
+            <a:ext cx="2447925" cy="257175"/>
+          </a:xfrm>
+          <a:prstGeom prst="rect">
+            <a:avLst/>
+          </a:prstGeom>
+        </p:spPr>
+      </p:pic>
     </p:spTree>
   </p:cSld>
   <p:clrMapOvr>

</xml_diff>